<commit_message>
travail sur le rendu
</commit_message>
<xml_diff>
--- a/Release/CR/Presentation/ASModee.pptx
+++ b/Release/CR/Presentation/ASModee.pptx
@@ -5,21 +5,24 @@
     <p:sldMasterId id="2147483744" r:id="rId1"/>
   </p:sldMasterIdLst>
   <p:notesMasterIdLst>
-    <p:notesMasterId r:id="rId14"/>
+    <p:notesMasterId r:id="rId17"/>
   </p:notesMasterIdLst>
   <p:sldIdLst>
     <p:sldId id="256" r:id="rId2"/>
-    <p:sldId id="265" r:id="rId3"/>
-    <p:sldId id="266" r:id="rId4"/>
-    <p:sldId id="267" r:id="rId5"/>
-    <p:sldId id="263" r:id="rId6"/>
-    <p:sldId id="262" r:id="rId7"/>
-    <p:sldId id="258" r:id="rId8"/>
-    <p:sldId id="264" r:id="rId9"/>
+    <p:sldId id="274" r:id="rId3"/>
+    <p:sldId id="265" r:id="rId4"/>
+    <p:sldId id="266" r:id="rId5"/>
+    <p:sldId id="262" r:id="rId6"/>
+    <p:sldId id="267" r:id="rId7"/>
+    <p:sldId id="263" r:id="rId8"/>
+    <p:sldId id="258" r:id="rId9"/>
     <p:sldId id="260" r:id="rId10"/>
-    <p:sldId id="268" r:id="rId11"/>
-    <p:sldId id="269" r:id="rId12"/>
-    <p:sldId id="270" r:id="rId13"/>
+    <p:sldId id="264" r:id="rId11"/>
+    <p:sldId id="268" r:id="rId12"/>
+    <p:sldId id="269" r:id="rId13"/>
+    <p:sldId id="270" r:id="rId14"/>
+    <p:sldId id="272" r:id="rId15"/>
+    <p:sldId id="273" r:id="rId16"/>
   </p:sldIdLst>
   <p:sldSz cx="12192000" cy="6858000"/>
   <p:notesSz cx="6858000" cy="9144000"/>
@@ -208,7 +211,7 @@
           <a:p>
             <a:fld id="{10F251A9-0EBE-42F9-A97E-5A1D70787C42}" type="datetimeFigureOut">
               <a:rPr lang="fr-FR" smtClean="0"/>
-              <a:t>03/05/2020</a:t>
+              <a:t>04/05/2020</a:t>
             </a:fld>
             <a:endParaRPr lang="fr-FR"/>
           </a:p>
@@ -702,7 +705,7 @@
           <a:p>
             <a:fld id="{6A2C7193-4A37-492B-859D-3EF3210FBAFE}" type="datetime1">
               <a:rPr lang="fr-FR" smtClean="0"/>
-              <a:t>03/05/2020</a:t>
+              <a:t>04/05/2020</a:t>
             </a:fld>
             <a:endParaRPr lang="fr-FR"/>
           </a:p>
@@ -910,7 +913,7 @@
           <a:p>
             <a:fld id="{10A66F1E-4B4E-4537-816C-9F6465236CA0}" type="datetime1">
               <a:rPr lang="fr-FR" smtClean="0"/>
-              <a:t>03/05/2020</a:t>
+              <a:t>04/05/2020</a:t>
             </a:fld>
             <a:endParaRPr lang="fr-FR"/>
           </a:p>
@@ -1166,7 +1169,7 @@
           <a:p>
             <a:fld id="{C6EAC722-590B-4F85-9409-5144E11DB134}" type="datetime1">
               <a:rPr lang="fr-FR" smtClean="0"/>
-              <a:t>03/05/2020</a:t>
+              <a:t>04/05/2020</a:t>
             </a:fld>
             <a:endParaRPr lang="fr-FR"/>
           </a:p>
@@ -1336,7 +1339,7 @@
           <a:p>
             <a:fld id="{F8508D51-AEE7-4597-BF71-997C5B758454}" type="datetime1">
               <a:rPr lang="fr-FR" smtClean="0"/>
-              <a:t>03/05/2020</a:t>
+              <a:t>04/05/2020</a:t>
             </a:fld>
             <a:endParaRPr lang="fr-FR"/>
           </a:p>
@@ -1679,7 +1682,7 @@
           <a:p>
             <a:fld id="{D4770A7D-C349-4091-A2BD-AD847753495F}" type="datetime1">
               <a:rPr lang="fr-FR" smtClean="0"/>
-              <a:t>03/05/2020</a:t>
+              <a:t>04/05/2020</a:t>
             </a:fld>
             <a:endParaRPr lang="fr-FR"/>
           </a:p>
@@ -1954,7 +1957,7 @@
           <a:p>
             <a:fld id="{DE838A4D-885B-4C10-B68D-8E0F6FF07AC3}" type="datetime1">
               <a:rPr lang="fr-FR" smtClean="0"/>
-              <a:t>03/05/2020</a:t>
+              <a:t>04/05/2020</a:t>
             </a:fld>
             <a:endParaRPr lang="fr-FR"/>
           </a:p>
@@ -2333,7 +2336,7 @@
           <a:p>
             <a:fld id="{C787E5B4-F4CE-4FC1-A01D-040E986E62F2}" type="datetime1">
               <a:rPr lang="fr-FR" smtClean="0"/>
-              <a:t>03/05/2020</a:t>
+              <a:t>04/05/2020</a:t>
             </a:fld>
             <a:endParaRPr lang="fr-FR"/>
           </a:p>
@@ -2451,7 +2454,7 @@
           <a:p>
             <a:fld id="{1B557CC2-3304-42EB-87B5-111DAFEF22A1}" type="datetime1">
               <a:rPr lang="fr-FR" smtClean="0"/>
-              <a:t>03/05/2020</a:t>
+              <a:t>04/05/2020</a:t>
             </a:fld>
             <a:endParaRPr lang="fr-FR"/>
           </a:p>
@@ -2622,7 +2625,7 @@
           <a:p>
             <a:fld id="{17A524E3-EFCE-4C11-A9E4-BDCB0A78B211}" type="datetime1">
               <a:rPr lang="fr-FR" smtClean="0"/>
-              <a:t>03/05/2020</a:t>
+              <a:t>04/05/2020</a:t>
             </a:fld>
             <a:endParaRPr lang="fr-FR"/>
           </a:p>
@@ -2976,7 +2979,7 @@
           <a:p>
             <a:fld id="{019752DD-6EC3-4564-810C-66E7EACBAB65}" type="datetime1">
               <a:rPr lang="fr-FR" smtClean="0"/>
-              <a:t>03/05/2020</a:t>
+              <a:t>04/05/2020</a:t>
             </a:fld>
             <a:endParaRPr lang="fr-FR"/>
           </a:p>
@@ -3353,7 +3356,7 @@
           <a:p>
             <a:fld id="{621F2227-F70D-4953-BD1E-06CE6C89486C}" type="datetime1">
               <a:rPr lang="fr-FR" smtClean="0"/>
-              <a:t>03/05/2020</a:t>
+              <a:t>04/05/2020</a:t>
             </a:fld>
             <a:endParaRPr lang="fr-FR"/>
           </a:p>
@@ -3640,7 +3643,7 @@
           <a:p>
             <a:fld id="{1A33B718-BFC0-4C03-8DBA-63A483F03BDE}" type="datetime1">
               <a:rPr lang="fr-FR" smtClean="0"/>
-              <a:t>03/05/2020</a:t>
+              <a:t>04/05/2020</a:t>
             </a:fld>
             <a:endParaRPr lang="fr-FR"/>
           </a:p>
@@ -4280,6 +4283,243 @@
       </p:grpSpPr>
       <p:sp>
         <p:nvSpPr>
+          <p:cNvPr id="4" name="Titel 3">
+            <a:extLst>
+              <a:ext uri="{FF2B5EF4-FFF2-40B4-BE49-F238E27FC236}">
+                <a16:creationId xmlns:a16="http://schemas.microsoft.com/office/drawing/2014/main" id="{8899405F-553D-4A09-B41B-681586078A50}"/>
+              </a:ext>
+            </a:extLst>
+          </p:cNvPr>
+          <p:cNvSpPr>
+            <a:spLocks noGrp="1"/>
+          </p:cNvSpPr>
+          <p:nvPr>
+            <p:ph type="title"/>
+          </p:nvPr>
+        </p:nvSpPr>
+        <p:spPr/>
+        <p:txBody>
+          <a:bodyPr/>
+          <a:lstStyle/>
+          <a:p>
+            <a:r>
+              <a:rPr lang="fr-FR" dirty="0"/>
+              <a:t>Conclusion &amp; Perspectives</a:t>
+            </a:r>
+          </a:p>
+        </p:txBody>
+      </p:sp>
+      <p:sp>
+        <p:nvSpPr>
+          <p:cNvPr id="5" name="Inhaltsplatzhalter 4">
+            <a:extLst>
+              <a:ext uri="{FF2B5EF4-FFF2-40B4-BE49-F238E27FC236}">
+                <a16:creationId xmlns:a16="http://schemas.microsoft.com/office/drawing/2014/main" id="{D5EAF7C7-E869-43AB-92B6-8316D82AD729}"/>
+              </a:ext>
+            </a:extLst>
+          </p:cNvPr>
+          <p:cNvSpPr>
+            <a:spLocks noGrp="1"/>
+          </p:cNvSpPr>
+          <p:nvPr>
+            <p:ph sz="half" idx="1"/>
+          </p:nvPr>
+        </p:nvSpPr>
+        <p:spPr/>
+        <p:txBody>
+          <a:bodyPr/>
+          <a:lstStyle/>
+          <a:p>
+            <a:pPr marL="0" indent="0">
+              <a:buNone/>
+            </a:pPr>
+            <a:r>
+              <a:rPr lang="fr-FR" dirty="0"/>
+              <a:t>POC:</a:t>
+            </a:r>
+          </a:p>
+          <a:p>
+            <a:r>
+              <a:rPr lang="fr-FR" dirty="0"/>
+              <a:t>Architecture fonctionnelle et adaptable</a:t>
+            </a:r>
+          </a:p>
+          <a:p>
+            <a:r>
+              <a:rPr lang="fr-FR" dirty="0"/>
+              <a:t>Exécution de programme assembleur simple</a:t>
+            </a:r>
+          </a:p>
+        </p:txBody>
+      </p:sp>
+      <p:sp>
+        <p:nvSpPr>
+          <p:cNvPr id="6" name="Inhaltsplatzhalter 5">
+            <a:extLst>
+              <a:ext uri="{FF2B5EF4-FFF2-40B4-BE49-F238E27FC236}">
+                <a16:creationId xmlns:a16="http://schemas.microsoft.com/office/drawing/2014/main" id="{6D0A172A-CE17-4F3B-8218-0C5A9C7BE949}"/>
+              </a:ext>
+            </a:extLst>
+          </p:cNvPr>
+          <p:cNvSpPr>
+            <a:spLocks noGrp="1"/>
+          </p:cNvSpPr>
+          <p:nvPr>
+            <p:ph sz="half" idx="2"/>
+          </p:nvPr>
+        </p:nvSpPr>
+        <p:spPr/>
+        <p:txBody>
+          <a:bodyPr/>
+          <a:lstStyle/>
+          <a:p>
+            <a:r>
+              <a:rPr lang="fr-FR" dirty="0"/>
+              <a:t>Gestion des exceptions</a:t>
+            </a:r>
+          </a:p>
+          <a:p>
+            <a:r>
+              <a:rPr lang="fr-FR" dirty="0"/>
+              <a:t>Différents modes d’exécution (</a:t>
+            </a:r>
+            <a:r>
+              <a:rPr lang="fr-FR" dirty="0" err="1"/>
+              <a:t>Debug</a:t>
+            </a:r>
+            <a:r>
+              <a:rPr lang="fr-FR" dirty="0"/>
+              <a:t>)</a:t>
+            </a:r>
+          </a:p>
+          <a:p>
+            <a:r>
+              <a:rPr lang="fr-FR" dirty="0"/>
+              <a:t>Gestion des CSR</a:t>
+            </a:r>
+          </a:p>
+          <a:p>
+            <a:r>
+              <a:rPr lang="fr-FR" dirty="0"/>
+              <a:t>Gestion des instructions comprimées</a:t>
+            </a:r>
+          </a:p>
+          <a:p>
+            <a:r>
+              <a:rPr lang="fr-FR" dirty="0"/>
+              <a:t>Ajout de fonctionnalités supplémentaires (p. ex. </a:t>
+            </a:r>
+            <a:r>
+              <a:rPr lang="fr-FR" dirty="0" err="1"/>
+              <a:t>Mult</a:t>
+            </a:r>
+            <a:r>
+              <a:rPr lang="fr-FR" dirty="0"/>
+              <a:t>/Div)</a:t>
+            </a:r>
+          </a:p>
+          <a:p>
+            <a:r>
+              <a:rPr lang="fr-FR" dirty="0"/>
+              <a:t>Revoir Fork et </a:t>
+            </a:r>
+            <a:r>
+              <a:rPr lang="fr-FR" dirty="0" err="1"/>
+              <a:t>Join</a:t>
+            </a:r>
+            <a:r>
+              <a:rPr lang="fr-FR" dirty="0"/>
+              <a:t> en Split et Merge</a:t>
+            </a:r>
+          </a:p>
+        </p:txBody>
+      </p:sp>
+      <p:sp>
+        <p:nvSpPr>
+          <p:cNvPr id="7" name="Fußzeilenplatzhalter 6">
+            <a:extLst>
+              <a:ext uri="{FF2B5EF4-FFF2-40B4-BE49-F238E27FC236}">
+                <a16:creationId xmlns:a16="http://schemas.microsoft.com/office/drawing/2014/main" id="{BBA56BB5-57E5-420F-A9D2-C325ECBEA65F}"/>
+              </a:ext>
+            </a:extLst>
+          </p:cNvPr>
+          <p:cNvSpPr>
+            <a:spLocks noGrp="1"/>
+          </p:cNvSpPr>
+          <p:nvPr>
+            <p:ph type="ftr" sz="quarter" idx="11"/>
+          </p:nvPr>
+        </p:nvSpPr>
+        <p:spPr/>
+        <p:txBody>
+          <a:bodyPr/>
+          <a:lstStyle/>
+          <a:p>
+            <a:endParaRPr lang="fr-FR"/>
+          </a:p>
+        </p:txBody>
+      </p:sp>
+      <p:sp>
+        <p:nvSpPr>
+          <p:cNvPr id="8" name="Foliennummernplatzhalter 7">
+            <a:extLst>
+              <a:ext uri="{FF2B5EF4-FFF2-40B4-BE49-F238E27FC236}">
+                <a16:creationId xmlns:a16="http://schemas.microsoft.com/office/drawing/2014/main" id="{F65BA561-27B5-49F8-A2B6-33549B4AB6D7}"/>
+              </a:ext>
+            </a:extLst>
+          </p:cNvPr>
+          <p:cNvSpPr>
+            <a:spLocks noGrp="1"/>
+          </p:cNvSpPr>
+          <p:nvPr>
+            <p:ph type="sldNum" sz="quarter" idx="12"/>
+          </p:nvPr>
+        </p:nvSpPr>
+        <p:spPr/>
+        <p:txBody>
+          <a:bodyPr/>
+          <a:lstStyle/>
+          <a:p>
+            <a:fld id="{EB019DF2-C5BA-49E0-AE61-5C48331C2434}" type="slidenum">
+              <a:rPr lang="fr-FR" smtClean="0"/>
+              <a:t>10</a:t>
+            </a:fld>
+            <a:endParaRPr lang="fr-FR"/>
+          </a:p>
+        </p:txBody>
+      </p:sp>
+    </p:spTree>
+    <p:extLst>
+      <p:ext uri="{BB962C8B-B14F-4D97-AF65-F5344CB8AC3E}">
+        <p14:creationId xmlns:p14="http://schemas.microsoft.com/office/powerpoint/2010/main" val="1500715639"/>
+      </p:ext>
+    </p:extLst>
+  </p:cSld>
+  <p:clrMapOvr>
+    <a:masterClrMapping/>
+  </p:clrMapOvr>
+</p:sld>
+</file>
+
+<file path=ppt/slides/slide11.xml><?xml version="1.0" encoding="utf-8"?>
+<p:sld xmlns:a="http://schemas.openxmlformats.org/drawingml/2006/main" xmlns:r="http://schemas.openxmlformats.org/officeDocument/2006/relationships" xmlns:p="http://schemas.openxmlformats.org/presentationml/2006/main">
+  <p:cSld>
+    <p:spTree>
+      <p:nvGrpSpPr>
+        <p:cNvPr id="1" name=""/>
+        <p:cNvGrpSpPr/>
+        <p:nvPr/>
+      </p:nvGrpSpPr>
+      <p:grpSpPr>
+        <a:xfrm>
+          <a:off x="0" y="0"/>
+          <a:ext cx="0" cy="0"/>
+          <a:chOff x="0" y="0"/>
+          <a:chExt cx="0" cy="0"/>
+        </a:xfrm>
+      </p:grpSpPr>
+      <p:sp>
+        <p:nvSpPr>
           <p:cNvPr id="2" name="Titel 1">
             <a:extLst>
               <a:ext uri="{FF2B5EF4-FFF2-40B4-BE49-F238E27FC236}">
@@ -4364,7 +4604,7 @@
           <a:p>
             <a:fld id="{EB019DF2-C5BA-49E0-AE61-5C48331C2434}" type="slidenum">
               <a:rPr lang="fr-FR" smtClean="0"/>
-              <a:t>10</a:t>
+              <a:t>11</a:t>
             </a:fld>
             <a:endParaRPr lang="fr-FR"/>
           </a:p>
@@ -4569,7 +4809,7 @@
 </p:sld>
 </file>
 
-<file path=ppt/slides/slide11.xml><?xml version="1.0" encoding="utf-8"?>
+<file path=ppt/slides/slide12.xml><?xml version="1.0" encoding="utf-8"?>
 <p:sld xmlns:a="http://schemas.openxmlformats.org/drawingml/2006/main" xmlns:r="http://schemas.openxmlformats.org/officeDocument/2006/relationships" xmlns:p="http://schemas.openxmlformats.org/presentationml/2006/main">
   <p:cSld>
     <p:spTree>
@@ -4642,7 +4882,7 @@
           <a:p>
             <a:fld id="{EB019DF2-C5BA-49E0-AE61-5C48331C2434}" type="slidenum">
               <a:rPr lang="fr-FR" smtClean="0"/>
-              <a:t>11</a:t>
+              <a:t>12</a:t>
             </a:fld>
             <a:endParaRPr lang="fr-FR"/>
           </a:p>
@@ -4696,7 +4936,7 @@
 </p:sld>
 </file>
 
-<file path=ppt/slides/slide12.xml><?xml version="1.0" encoding="utf-8"?>
+<file path=ppt/slides/slide13.xml><?xml version="1.0" encoding="utf-8"?>
 <p:sld xmlns:a="http://schemas.openxmlformats.org/drawingml/2006/main" xmlns:r="http://schemas.openxmlformats.org/officeDocument/2006/relationships" xmlns:p="http://schemas.openxmlformats.org/presentationml/2006/main">
   <p:cSld>
     <p:spTree>
@@ -4736,13 +4976,8 @@
           <a:p>
             <a:r>
               <a:rPr lang="fr-FR" dirty="0"/>
-              <a:t>Annexe C: Chronogramme 2 </a:t>
-            </a:r>
-            <a:r>
-              <a:rPr lang="fr-FR" dirty="0" err="1"/>
-              <a:t>controleurs</a:t>
-            </a:r>
-            <a:endParaRPr lang="fr-FR" dirty="0"/>
+              <a:t>Annexe C: Chronogramme 2 contrôleurs</a:t>
+            </a:r>
           </a:p>
         </p:txBody>
       </p:sp>
@@ -4769,7 +5004,7 @@
           <a:p>
             <a:fld id="{EB019DF2-C5BA-49E0-AE61-5C48331C2434}" type="slidenum">
               <a:rPr lang="fr-FR" smtClean="0"/>
-              <a:t>12</a:t>
+              <a:t>13</a:t>
             </a:fld>
             <a:endParaRPr lang="fr-FR"/>
           </a:p>
@@ -4823,6 +5058,255 @@
 </p:sld>
 </file>
 
+<file path=ppt/slides/slide14.xml><?xml version="1.0" encoding="utf-8"?>
+<p:sld xmlns:a="http://schemas.openxmlformats.org/drawingml/2006/main" xmlns:r="http://schemas.openxmlformats.org/officeDocument/2006/relationships" xmlns:p="http://schemas.openxmlformats.org/presentationml/2006/main">
+  <p:cSld>
+    <p:spTree>
+      <p:nvGrpSpPr>
+        <p:cNvPr id="1" name=""/>
+        <p:cNvGrpSpPr/>
+        <p:nvPr/>
+      </p:nvGrpSpPr>
+      <p:grpSpPr>
+        <a:xfrm>
+          <a:off x="0" y="0"/>
+          <a:ext cx="0" cy="0"/>
+          <a:chOff x="0" y="0"/>
+          <a:chExt cx="0" cy="0"/>
+        </a:xfrm>
+      </p:grpSpPr>
+      <p:sp>
+        <p:nvSpPr>
+          <p:cNvPr id="2" name="Titel 1">
+            <a:extLst>
+              <a:ext uri="{FF2B5EF4-FFF2-40B4-BE49-F238E27FC236}">
+                <a16:creationId xmlns:a16="http://schemas.microsoft.com/office/drawing/2014/main" id="{C090862E-DD31-462F-B417-3DF72658AE99}"/>
+              </a:ext>
+            </a:extLst>
+          </p:cNvPr>
+          <p:cNvSpPr>
+            <a:spLocks noGrp="1"/>
+          </p:cNvSpPr>
+          <p:nvPr>
+            <p:ph type="title"/>
+          </p:nvPr>
+        </p:nvSpPr>
+        <p:spPr/>
+        <p:txBody>
+          <a:bodyPr/>
+          <a:lstStyle/>
+          <a:p>
+            <a:r>
+              <a:rPr lang="fr-FR" dirty="0"/>
+              <a:t>Annexe D: Chronogramme contrôleur et BUS</a:t>
+            </a:r>
+          </a:p>
+        </p:txBody>
+      </p:sp>
+      <p:sp>
+        <p:nvSpPr>
+          <p:cNvPr id="5" name="Foliennummernplatzhalter 4">
+            <a:extLst>
+              <a:ext uri="{FF2B5EF4-FFF2-40B4-BE49-F238E27FC236}">
+                <a16:creationId xmlns:a16="http://schemas.microsoft.com/office/drawing/2014/main" id="{B2CFCC1B-F843-4604-8FE8-DC83B3677F9C}"/>
+              </a:ext>
+            </a:extLst>
+          </p:cNvPr>
+          <p:cNvSpPr>
+            <a:spLocks noGrp="1"/>
+          </p:cNvSpPr>
+          <p:nvPr>
+            <p:ph type="sldNum" sz="quarter" idx="12"/>
+          </p:nvPr>
+        </p:nvSpPr>
+        <p:spPr/>
+        <p:txBody>
+          <a:bodyPr/>
+          <a:lstStyle/>
+          <a:p>
+            <a:fld id="{EB019DF2-C5BA-49E0-AE61-5C48331C2434}" type="slidenum">
+              <a:rPr lang="fr-FR" smtClean="0"/>
+              <a:t>14</a:t>
+            </a:fld>
+            <a:endParaRPr lang="fr-FR"/>
+          </a:p>
+        </p:txBody>
+      </p:sp>
+      <p:pic>
+        <p:nvPicPr>
+          <p:cNvPr id="8" name="Inhaltsplatzhalter 7">
+            <a:extLst>
+              <a:ext uri="{FF2B5EF4-FFF2-40B4-BE49-F238E27FC236}">
+                <a16:creationId xmlns:a16="http://schemas.microsoft.com/office/drawing/2014/main" id="{8FB7DD67-032F-4C3A-8AAD-0F0034070253}"/>
+              </a:ext>
+            </a:extLst>
+          </p:cNvPr>
+          <p:cNvPicPr>
+            <a:picLocks noGrp="1" noChangeAspect="1"/>
+          </p:cNvPicPr>
+          <p:nvPr>
+            <p:ph idx="1"/>
+          </p:nvPr>
+        </p:nvPicPr>
+        <p:blipFill>
+          <a:blip r:embed="rId2">
+            <a:extLst>
+              <a:ext uri="{28A0092B-C50C-407E-A947-70E740481C1C}">
+                <a14:useLocalDpi xmlns:a14="http://schemas.microsoft.com/office/drawing/2010/main" val="0"/>
+              </a:ext>
+            </a:extLst>
+          </a:blip>
+          <a:stretch>
+            <a:fillRect/>
+          </a:stretch>
+        </p:blipFill>
+        <p:spPr>
+          <a:xfrm>
+            <a:off x="1484874" y="2087210"/>
+            <a:ext cx="9283212" cy="4022725"/>
+          </a:xfrm>
+        </p:spPr>
+      </p:pic>
+    </p:spTree>
+    <p:extLst>
+      <p:ext uri="{BB962C8B-B14F-4D97-AF65-F5344CB8AC3E}">
+        <p14:creationId xmlns:p14="http://schemas.microsoft.com/office/powerpoint/2010/main" val="3216275134"/>
+      </p:ext>
+    </p:extLst>
+  </p:cSld>
+  <p:clrMapOvr>
+    <a:masterClrMapping/>
+  </p:clrMapOvr>
+</p:sld>
+</file>
+
+<file path=ppt/slides/slide15.xml><?xml version="1.0" encoding="utf-8"?>
+<p:sld xmlns:a="http://schemas.openxmlformats.org/drawingml/2006/main" xmlns:r="http://schemas.openxmlformats.org/officeDocument/2006/relationships" xmlns:p="http://schemas.openxmlformats.org/presentationml/2006/main">
+  <p:cSld>
+    <p:spTree>
+      <p:nvGrpSpPr>
+        <p:cNvPr id="1" name=""/>
+        <p:cNvGrpSpPr/>
+        <p:nvPr/>
+      </p:nvGrpSpPr>
+      <p:grpSpPr>
+        <a:xfrm>
+          <a:off x="0" y="0"/>
+          <a:ext cx="0" cy="0"/>
+          <a:chOff x="0" y="0"/>
+          <a:chExt cx="0" cy="0"/>
+        </a:xfrm>
+      </p:grpSpPr>
+      <p:sp>
+        <p:nvSpPr>
+          <p:cNvPr id="2" name="Titel 1">
+            <a:extLst>
+              <a:ext uri="{FF2B5EF4-FFF2-40B4-BE49-F238E27FC236}">
+                <a16:creationId xmlns:a16="http://schemas.microsoft.com/office/drawing/2014/main" id="{C090862E-DD31-462F-B417-3DF72658AE99}"/>
+              </a:ext>
+            </a:extLst>
+          </p:cNvPr>
+          <p:cNvSpPr>
+            <a:spLocks noGrp="1"/>
+          </p:cNvSpPr>
+          <p:nvPr>
+            <p:ph type="title"/>
+          </p:nvPr>
+        </p:nvSpPr>
+        <p:spPr/>
+        <p:txBody>
+          <a:bodyPr/>
+          <a:lstStyle/>
+          <a:p>
+            <a:r>
+              <a:rPr lang="fr-FR" dirty="0"/>
+              <a:t>Annexe E: Chronogramme </a:t>
+            </a:r>
+            <a:r>
+              <a:rPr lang="fr-FR" dirty="0" err="1"/>
+              <a:t>asmodee</a:t>
+            </a:r>
+            <a:endParaRPr lang="fr-FR" dirty="0"/>
+          </a:p>
+        </p:txBody>
+      </p:sp>
+      <p:sp>
+        <p:nvSpPr>
+          <p:cNvPr id="5" name="Foliennummernplatzhalter 4">
+            <a:extLst>
+              <a:ext uri="{FF2B5EF4-FFF2-40B4-BE49-F238E27FC236}">
+                <a16:creationId xmlns:a16="http://schemas.microsoft.com/office/drawing/2014/main" id="{B2CFCC1B-F843-4604-8FE8-DC83B3677F9C}"/>
+              </a:ext>
+            </a:extLst>
+          </p:cNvPr>
+          <p:cNvSpPr>
+            <a:spLocks noGrp="1"/>
+          </p:cNvSpPr>
+          <p:nvPr>
+            <p:ph type="sldNum" sz="quarter" idx="12"/>
+          </p:nvPr>
+        </p:nvSpPr>
+        <p:spPr/>
+        <p:txBody>
+          <a:bodyPr/>
+          <a:lstStyle/>
+          <a:p>
+            <a:fld id="{EB019DF2-C5BA-49E0-AE61-5C48331C2434}" type="slidenum">
+              <a:rPr lang="fr-FR" smtClean="0"/>
+              <a:t>15</a:t>
+            </a:fld>
+            <a:endParaRPr lang="fr-FR"/>
+          </a:p>
+        </p:txBody>
+      </p:sp>
+      <p:pic>
+        <p:nvPicPr>
+          <p:cNvPr id="7" name="Inhaltsplatzhalter 6">
+            <a:extLst>
+              <a:ext uri="{FF2B5EF4-FFF2-40B4-BE49-F238E27FC236}">
+                <a16:creationId xmlns:a16="http://schemas.microsoft.com/office/drawing/2014/main" id="{874DD551-5AF3-4A7C-A6C2-BCB608699533}"/>
+              </a:ext>
+            </a:extLst>
+          </p:cNvPr>
+          <p:cNvPicPr>
+            <a:picLocks noGrp="1" noChangeAspect="1"/>
+          </p:cNvPicPr>
+          <p:nvPr>
+            <p:ph idx="1"/>
+          </p:nvPr>
+        </p:nvPicPr>
+        <p:blipFill>
+          <a:blip r:embed="rId2">
+            <a:extLst>
+              <a:ext uri="{28A0092B-C50C-407E-A947-70E740481C1C}">
+                <a14:useLocalDpi xmlns:a14="http://schemas.microsoft.com/office/drawing/2010/main" val="0"/>
+              </a:ext>
+            </a:extLst>
+          </a:blip>
+          <a:stretch>
+            <a:fillRect/>
+          </a:stretch>
+        </p:blipFill>
+        <p:spPr>
+          <a:xfrm>
+            <a:off x="1329503" y="1881143"/>
+            <a:ext cx="9532993" cy="4257368"/>
+          </a:xfrm>
+        </p:spPr>
+      </p:pic>
+    </p:spTree>
+    <p:extLst>
+      <p:ext uri="{BB962C8B-B14F-4D97-AF65-F5344CB8AC3E}">
+        <p14:creationId xmlns:p14="http://schemas.microsoft.com/office/powerpoint/2010/main" val="3942741735"/>
+      </p:ext>
+    </p:extLst>
+  </p:cSld>
+  <p:clrMapOvr>
+    <a:masterClrMapping/>
+  </p:clrMapOvr>
+</p:sld>
+</file>
+
 <file path=ppt/slides/slide2.xml><?xml version="1.0" encoding="utf-8"?>
 <p:sld xmlns:a="http://schemas.openxmlformats.org/drawingml/2006/main" xmlns:r="http://schemas.openxmlformats.org/officeDocument/2006/relationships" xmlns:p="http://schemas.openxmlformats.org/presentationml/2006/main">
   <p:cSld>
@@ -4842,10 +5326,10 @@
       </p:grpSpPr>
       <p:sp>
         <p:nvSpPr>
-          <p:cNvPr id="5" name="Titel 4">
+          <p:cNvPr id="2" name="Titel 1">
             <a:extLst>
               <a:ext uri="{FF2B5EF4-FFF2-40B4-BE49-F238E27FC236}">
-                <a16:creationId xmlns:a16="http://schemas.microsoft.com/office/drawing/2014/main" id="{584E7D89-491D-4CD5-90A1-BE3CAAB722EB}"/>
+                <a16:creationId xmlns:a16="http://schemas.microsoft.com/office/drawing/2014/main" id="{2CD4AA29-A272-42D3-986B-B24DB5703F3C}"/>
               </a:ext>
             </a:extLst>
           </p:cNvPr>
@@ -4863,55 +5347,171 @@
           <a:p>
             <a:r>
               <a:rPr lang="fr-FR" dirty="0"/>
-              <a:t>RISC V - Ibex</a:t>
-            </a:r>
-          </a:p>
-        </p:txBody>
-      </p:sp>
-      <p:pic>
-        <p:nvPicPr>
-          <p:cNvPr id="7" name="Inhaltsplatzhalter 4">
+              <a:t>Sommaire</a:t>
+            </a:r>
+          </a:p>
+        </p:txBody>
+      </p:sp>
+      <p:sp>
+        <p:nvSpPr>
+          <p:cNvPr id="3" name="Inhaltsplatzhalter 2">
             <a:extLst>
               <a:ext uri="{FF2B5EF4-FFF2-40B4-BE49-F238E27FC236}">
-                <a16:creationId xmlns:a16="http://schemas.microsoft.com/office/drawing/2014/main" id="{F273D4CF-CEE1-471B-8993-59EB2401A9AA}"/>
+                <a16:creationId xmlns:a16="http://schemas.microsoft.com/office/drawing/2014/main" id="{0F7C23C6-F223-4851-B59D-87EA920AA6B3}"/>
               </a:ext>
             </a:extLst>
           </p:cNvPr>
-          <p:cNvPicPr>
-            <a:picLocks noGrp="1" noChangeAspect="1"/>
-          </p:cNvPicPr>
+          <p:cNvSpPr>
+            <a:spLocks noGrp="1"/>
+          </p:cNvSpPr>
           <p:nvPr>
             <p:ph idx="1"/>
           </p:nvPr>
-        </p:nvPicPr>
-        <p:blipFill>
-          <a:blip r:embed="rId2">
-            <a:extLst>
-              <a:ext uri="{28A0092B-C50C-407E-A947-70E740481C1C}">
-                <a14:useLocalDpi xmlns:a14="http://schemas.microsoft.com/office/drawing/2010/main" val="0"/>
-              </a:ext>
-              <a:ext uri="{96DAC541-7B7A-43D3-8B79-37D633B846F1}">
-                <asvg:svgBlip xmlns:asvg="http://schemas.microsoft.com/office/drawing/2016/SVG/main" r:embed="rId3"/>
-              </a:ext>
-            </a:extLst>
-          </a:blip>
-          <a:stretch>
-            <a:fillRect/>
-          </a:stretch>
-        </p:blipFill>
-        <p:spPr>
-          <a:xfrm>
-            <a:off x="1097280" y="1931297"/>
-            <a:ext cx="10058400" cy="4173167"/>
-          </a:xfrm>
-        </p:spPr>
-      </p:pic>
-      <p:sp>
-        <p:nvSpPr>
-          <p:cNvPr id="8" name="Fußzeilenplatzhalter 7">
+        </p:nvSpPr>
+        <p:spPr/>
+        <p:txBody>
+          <a:bodyPr numCol="2"/>
+          <a:lstStyle/>
+          <a:p>
+            <a:r>
+              <a:rPr lang="fr-FR" dirty="0"/>
+              <a:t>RISC V</a:t>
+            </a:r>
+          </a:p>
+          <a:p>
+            <a:pPr lvl="1"/>
+            <a:r>
+              <a:rPr lang="fr-FR" dirty="0"/>
+              <a:t>Ibex</a:t>
+            </a:r>
+          </a:p>
+          <a:p>
+            <a:pPr lvl="1"/>
+            <a:r>
+              <a:rPr lang="fr-FR" dirty="0"/>
+              <a:t>ARISC</a:t>
+            </a:r>
+          </a:p>
+          <a:p>
+            <a:r>
+              <a:rPr lang="fr-FR" dirty="0"/>
+              <a:t>Asynchrone</a:t>
+            </a:r>
+          </a:p>
+          <a:p>
+            <a:pPr lvl="1"/>
+            <a:r>
+              <a:rPr lang="fr-FR" dirty="0"/>
+              <a:t>Handshake</a:t>
+            </a:r>
+          </a:p>
+          <a:p>
+            <a:pPr lvl="1"/>
+            <a:r>
+              <a:rPr lang="fr-FR" dirty="0" err="1"/>
+              <a:t>Muller’s</a:t>
+            </a:r>
+            <a:r>
+              <a:rPr lang="fr-FR" dirty="0"/>
+              <a:t> </a:t>
+            </a:r>
+            <a:r>
+              <a:rPr lang="fr-FR" dirty="0" err="1"/>
+              <a:t>Gate</a:t>
+            </a:r>
+            <a:endParaRPr lang="fr-FR" dirty="0"/>
+          </a:p>
+          <a:p>
+            <a:pPr lvl="1"/>
+            <a:r>
+              <a:rPr lang="fr-FR" dirty="0"/>
+              <a:t>Architecture d’un bloc</a:t>
+            </a:r>
+          </a:p>
+          <a:p>
+            <a:r>
+              <a:rPr lang="fr-FR" dirty="0"/>
+              <a:t>Flot et Méthodologie</a:t>
+            </a:r>
+          </a:p>
+          <a:p>
+            <a:r>
+              <a:rPr lang="fr-FR" dirty="0"/>
+              <a:t>Résultats et Perspective</a:t>
+            </a:r>
+          </a:p>
+          <a:p>
+            <a:r>
+              <a:rPr lang="fr-FR" dirty="0"/>
+              <a:t>Conclusion</a:t>
+            </a:r>
+          </a:p>
+          <a:p>
+            <a:pPr marL="201168" lvl="1" indent="0">
+              <a:buNone/>
+            </a:pPr>
+            <a:r>
+              <a:rPr lang="fr-FR" sz="2000" dirty="0"/>
+              <a:t>Annexes</a:t>
+            </a:r>
+          </a:p>
+          <a:p>
+            <a:pPr lvl="2"/>
+            <a:r>
+              <a:rPr lang="fr-FR" sz="1800" dirty="0"/>
+              <a:t>A - 4-Phase Handshake</a:t>
+            </a:r>
+          </a:p>
+          <a:p>
+            <a:pPr lvl="2"/>
+            <a:r>
+              <a:rPr lang="fr-FR" sz="1800" dirty="0"/>
+              <a:t>B - Chronogramme C-</a:t>
+            </a:r>
+            <a:r>
+              <a:rPr lang="fr-FR" sz="1800" dirty="0" err="1"/>
+              <a:t>element</a:t>
+            </a:r>
+            <a:endParaRPr lang="fr-FR" sz="1800" dirty="0"/>
+          </a:p>
+          <a:p>
+            <a:pPr lvl="2"/>
+            <a:r>
+              <a:rPr lang="fr-FR" sz="1800" dirty="0"/>
+              <a:t>C - Chronogramme 2 contrôleurs</a:t>
+            </a:r>
+          </a:p>
+          <a:p>
+            <a:pPr lvl="2"/>
+            <a:r>
+              <a:rPr lang="fr-FR" sz="1800" dirty="0"/>
+              <a:t>D - Chronogramme contrôleur et BUS</a:t>
+            </a:r>
+          </a:p>
+          <a:p>
+            <a:pPr lvl="2"/>
+            <a:r>
+              <a:rPr lang="fr-FR" sz="1800" dirty="0"/>
+              <a:t>E - Chronogramme </a:t>
+            </a:r>
+            <a:r>
+              <a:rPr lang="fr-FR" sz="1800" dirty="0" err="1"/>
+              <a:t>asmodee</a:t>
+            </a:r>
+            <a:endParaRPr lang="fr-FR" sz="1800" dirty="0"/>
+          </a:p>
+          <a:p>
+            <a:pPr lvl="1"/>
+            <a:endParaRPr lang="fr-FR" dirty="0"/>
+          </a:p>
+        </p:txBody>
+      </p:sp>
+      <p:sp>
+        <p:nvSpPr>
+          <p:cNvPr id="4" name="Fußzeilenplatzhalter 3">
             <a:extLst>
               <a:ext uri="{FF2B5EF4-FFF2-40B4-BE49-F238E27FC236}">
-                <a16:creationId xmlns:a16="http://schemas.microsoft.com/office/drawing/2014/main" id="{795CD46B-A9E8-4918-9112-8A6B23DBD0C7}"/>
+                <a16:creationId xmlns:a16="http://schemas.microsoft.com/office/drawing/2014/main" id="{D150B0CD-4A8B-4F78-9831-F74DDB82F5B5}"/>
               </a:ext>
             </a:extLst>
           </p:cNvPr>
@@ -4922,39 +5522,21 @@
             <p:ph type="ftr" sz="quarter" idx="11"/>
           </p:nvPr>
         </p:nvSpPr>
-        <p:spPr>
-          <a:xfrm>
-            <a:off x="0" y="6459785"/>
-            <a:ext cx="11212483" cy="365125"/>
-          </a:xfrm>
-        </p:spPr>
-        <p:txBody>
-          <a:bodyPr/>
-          <a:lstStyle/>
-          <a:p>
-            <a:r>
-              <a:rPr lang="fr-FR" dirty="0"/>
-              <a:t>[1] : </a:t>
-            </a:r>
-            <a:r>
-              <a:rPr lang="fr-FR" dirty="0">
-                <a:hlinkClick r:id="rId4"/>
-              </a:rPr>
-              <a:t>https://ibex-core.readthedocs.io/en/latest/</a:t>
-            </a:r>
-            <a:r>
-              <a:rPr lang="fr-FR" dirty="0"/>
-              <a:t> </a:t>
-            </a:r>
-          </a:p>
-        </p:txBody>
-      </p:sp>
-      <p:sp>
-        <p:nvSpPr>
-          <p:cNvPr id="9" name="Foliennummernplatzhalter 8">
+        <p:spPr/>
+        <p:txBody>
+          <a:bodyPr/>
+          <a:lstStyle/>
+          <a:p>
+            <a:endParaRPr lang="fr-FR"/>
+          </a:p>
+        </p:txBody>
+      </p:sp>
+      <p:sp>
+        <p:nvSpPr>
+          <p:cNvPr id="5" name="Foliennummernplatzhalter 4">
             <a:extLst>
               <a:ext uri="{FF2B5EF4-FFF2-40B4-BE49-F238E27FC236}">
-                <a16:creationId xmlns:a16="http://schemas.microsoft.com/office/drawing/2014/main" id="{44E03862-262E-4AE2-A5D9-303A3BD05266}"/>
+                <a16:creationId xmlns:a16="http://schemas.microsoft.com/office/drawing/2014/main" id="{2A907A6D-2CBE-4940-8276-203E2DDB9112}"/>
               </a:ext>
             </a:extLst>
           </p:cNvPr>
@@ -4981,7 +5563,7 @@
     </p:spTree>
     <p:extLst>
       <p:ext uri="{BB962C8B-B14F-4D97-AF65-F5344CB8AC3E}">
-        <p14:creationId xmlns:p14="http://schemas.microsoft.com/office/powerpoint/2010/main" val="3328604120"/>
+        <p14:creationId xmlns:p14="http://schemas.microsoft.com/office/powerpoint/2010/main" val="973842112"/>
       </p:ext>
     </p:extLst>
   </p:cSld>
@@ -5010,6 +5592,174 @@
       </p:grpSpPr>
       <p:sp>
         <p:nvSpPr>
+          <p:cNvPr id="5" name="Titel 4">
+            <a:extLst>
+              <a:ext uri="{FF2B5EF4-FFF2-40B4-BE49-F238E27FC236}">
+                <a16:creationId xmlns:a16="http://schemas.microsoft.com/office/drawing/2014/main" id="{584E7D89-491D-4CD5-90A1-BE3CAAB722EB}"/>
+              </a:ext>
+            </a:extLst>
+          </p:cNvPr>
+          <p:cNvSpPr>
+            <a:spLocks noGrp="1"/>
+          </p:cNvSpPr>
+          <p:nvPr>
+            <p:ph type="title"/>
+          </p:nvPr>
+        </p:nvSpPr>
+        <p:spPr/>
+        <p:txBody>
+          <a:bodyPr/>
+          <a:lstStyle/>
+          <a:p>
+            <a:r>
+              <a:rPr lang="fr-FR" dirty="0"/>
+              <a:t>RISC V - Ibex</a:t>
+            </a:r>
+          </a:p>
+        </p:txBody>
+      </p:sp>
+      <p:pic>
+        <p:nvPicPr>
+          <p:cNvPr id="7" name="Inhaltsplatzhalter 4">
+            <a:extLst>
+              <a:ext uri="{FF2B5EF4-FFF2-40B4-BE49-F238E27FC236}">
+                <a16:creationId xmlns:a16="http://schemas.microsoft.com/office/drawing/2014/main" id="{F273D4CF-CEE1-471B-8993-59EB2401A9AA}"/>
+              </a:ext>
+            </a:extLst>
+          </p:cNvPr>
+          <p:cNvPicPr>
+            <a:picLocks noGrp="1" noChangeAspect="1"/>
+          </p:cNvPicPr>
+          <p:nvPr>
+            <p:ph idx="1"/>
+          </p:nvPr>
+        </p:nvPicPr>
+        <p:blipFill>
+          <a:blip r:embed="rId2">
+            <a:extLst>
+              <a:ext uri="{28A0092B-C50C-407E-A947-70E740481C1C}">
+                <a14:useLocalDpi xmlns:a14="http://schemas.microsoft.com/office/drawing/2010/main" val="0"/>
+              </a:ext>
+              <a:ext uri="{96DAC541-7B7A-43D3-8B79-37D633B846F1}">
+                <asvg:svgBlip xmlns:asvg="http://schemas.microsoft.com/office/drawing/2016/SVG/main" r:embed="rId3"/>
+              </a:ext>
+            </a:extLst>
+          </a:blip>
+          <a:stretch>
+            <a:fillRect/>
+          </a:stretch>
+        </p:blipFill>
+        <p:spPr>
+          <a:xfrm>
+            <a:off x="1097280" y="1931297"/>
+            <a:ext cx="10058400" cy="4173167"/>
+          </a:xfrm>
+        </p:spPr>
+      </p:pic>
+      <p:sp>
+        <p:nvSpPr>
+          <p:cNvPr id="8" name="Fußzeilenplatzhalter 7">
+            <a:extLst>
+              <a:ext uri="{FF2B5EF4-FFF2-40B4-BE49-F238E27FC236}">
+                <a16:creationId xmlns:a16="http://schemas.microsoft.com/office/drawing/2014/main" id="{795CD46B-A9E8-4918-9112-8A6B23DBD0C7}"/>
+              </a:ext>
+            </a:extLst>
+          </p:cNvPr>
+          <p:cNvSpPr>
+            <a:spLocks noGrp="1"/>
+          </p:cNvSpPr>
+          <p:nvPr>
+            <p:ph type="ftr" sz="quarter" idx="11"/>
+          </p:nvPr>
+        </p:nvSpPr>
+        <p:spPr>
+          <a:xfrm>
+            <a:off x="0" y="6459785"/>
+            <a:ext cx="11212483" cy="365125"/>
+          </a:xfrm>
+        </p:spPr>
+        <p:txBody>
+          <a:bodyPr/>
+          <a:lstStyle/>
+          <a:p>
+            <a:r>
+              <a:rPr lang="fr-FR" dirty="0"/>
+              <a:t>[1] : </a:t>
+            </a:r>
+            <a:r>
+              <a:rPr lang="fr-FR" dirty="0">
+                <a:hlinkClick r:id="rId4"/>
+              </a:rPr>
+              <a:t>https://ibex-core.readthedocs.io/en/latest/</a:t>
+            </a:r>
+            <a:r>
+              <a:rPr lang="fr-FR" dirty="0"/>
+              <a:t> </a:t>
+            </a:r>
+          </a:p>
+        </p:txBody>
+      </p:sp>
+      <p:sp>
+        <p:nvSpPr>
+          <p:cNvPr id="9" name="Foliennummernplatzhalter 8">
+            <a:extLst>
+              <a:ext uri="{FF2B5EF4-FFF2-40B4-BE49-F238E27FC236}">
+                <a16:creationId xmlns:a16="http://schemas.microsoft.com/office/drawing/2014/main" id="{44E03862-262E-4AE2-A5D9-303A3BD05266}"/>
+              </a:ext>
+            </a:extLst>
+          </p:cNvPr>
+          <p:cNvSpPr>
+            <a:spLocks noGrp="1"/>
+          </p:cNvSpPr>
+          <p:nvPr>
+            <p:ph type="sldNum" sz="quarter" idx="12"/>
+          </p:nvPr>
+        </p:nvSpPr>
+        <p:spPr/>
+        <p:txBody>
+          <a:bodyPr/>
+          <a:lstStyle/>
+          <a:p>
+            <a:fld id="{EB019DF2-C5BA-49E0-AE61-5C48331C2434}" type="slidenum">
+              <a:rPr lang="fr-FR" smtClean="0"/>
+              <a:t>3</a:t>
+            </a:fld>
+            <a:endParaRPr lang="fr-FR"/>
+          </a:p>
+        </p:txBody>
+      </p:sp>
+    </p:spTree>
+    <p:extLst>
+      <p:ext uri="{BB962C8B-B14F-4D97-AF65-F5344CB8AC3E}">
+        <p14:creationId xmlns:p14="http://schemas.microsoft.com/office/powerpoint/2010/main" val="3328604120"/>
+      </p:ext>
+    </p:extLst>
+  </p:cSld>
+  <p:clrMapOvr>
+    <a:masterClrMapping/>
+  </p:clrMapOvr>
+</p:sld>
+</file>
+
+<file path=ppt/slides/slide4.xml><?xml version="1.0" encoding="utf-8"?>
+<p:sld xmlns:a="http://schemas.openxmlformats.org/drawingml/2006/main" xmlns:r="http://schemas.openxmlformats.org/officeDocument/2006/relationships" xmlns:p="http://schemas.openxmlformats.org/presentationml/2006/main">
+  <p:cSld>
+    <p:spTree>
+      <p:nvGrpSpPr>
+        <p:cNvPr id="1" name=""/>
+        <p:cNvGrpSpPr/>
+        <p:nvPr/>
+      </p:nvGrpSpPr>
+      <p:grpSpPr>
+        <a:xfrm>
+          <a:off x="0" y="0"/>
+          <a:ext cx="0" cy="0"/>
+          <a:chOff x="0" y="0"/>
+          <a:chExt cx="0" cy="0"/>
+        </a:xfrm>
+      </p:grpSpPr>
+      <p:sp>
+        <p:nvSpPr>
           <p:cNvPr id="2" name="Titel 1">
             <a:extLst>
               <a:ext uri="{FF2B5EF4-FFF2-40B4-BE49-F238E27FC236}">
@@ -5181,7 +5931,7 @@
           <a:p>
             <a:fld id="{EB019DF2-C5BA-49E0-AE61-5C48331C2434}" type="slidenum">
               <a:rPr lang="fr-FR" smtClean="0"/>
-              <a:t>3</a:t>
+              <a:t>4</a:t>
             </a:fld>
             <a:endParaRPr lang="fr-FR"/>
           </a:p>
@@ -5200,7 +5950,154 @@
 </p:sld>
 </file>
 
-<file path=ppt/slides/slide4.xml><?xml version="1.0" encoding="utf-8"?>
+<file path=ppt/slides/slide5.xml><?xml version="1.0" encoding="utf-8"?>
+<p:sld xmlns:a="http://schemas.openxmlformats.org/drawingml/2006/main" xmlns:r="http://schemas.openxmlformats.org/officeDocument/2006/relationships" xmlns:p="http://schemas.openxmlformats.org/presentationml/2006/main">
+  <p:cSld>
+    <p:spTree>
+      <p:nvGrpSpPr>
+        <p:cNvPr id="1" name=""/>
+        <p:cNvGrpSpPr/>
+        <p:nvPr/>
+      </p:nvGrpSpPr>
+      <p:grpSpPr>
+        <a:xfrm>
+          <a:off x="0" y="0"/>
+          <a:ext cx="0" cy="0"/>
+          <a:chOff x="0" y="0"/>
+          <a:chExt cx="0" cy="0"/>
+        </a:xfrm>
+      </p:grpSpPr>
+      <p:sp>
+        <p:nvSpPr>
+          <p:cNvPr id="2" name="Titel 1">
+            <a:extLst>
+              <a:ext uri="{FF2B5EF4-FFF2-40B4-BE49-F238E27FC236}">
+                <a16:creationId xmlns:a16="http://schemas.microsoft.com/office/drawing/2014/main" id="{7434FCEC-02D2-4AB8-8029-D3E6EDFE2DAF}"/>
+              </a:ext>
+            </a:extLst>
+          </p:cNvPr>
+          <p:cNvSpPr>
+            <a:spLocks noGrp="1"/>
+          </p:cNvSpPr>
+          <p:nvPr>
+            <p:ph type="title"/>
+          </p:nvPr>
+        </p:nvSpPr>
+        <p:spPr/>
+        <p:txBody>
+          <a:bodyPr/>
+          <a:lstStyle/>
+          <a:p>
+            <a:r>
+              <a:rPr lang="fr-FR" dirty="0"/>
+              <a:t>Asynchrone - Handshake</a:t>
+            </a:r>
+          </a:p>
+        </p:txBody>
+      </p:sp>
+      <p:sp>
+        <p:nvSpPr>
+          <p:cNvPr id="6" name="Fußzeilenplatzhalter 5">
+            <a:extLst>
+              <a:ext uri="{FF2B5EF4-FFF2-40B4-BE49-F238E27FC236}">
+                <a16:creationId xmlns:a16="http://schemas.microsoft.com/office/drawing/2014/main" id="{C4D725A6-6D53-4091-A949-3B4755B8B8FA}"/>
+              </a:ext>
+            </a:extLst>
+          </p:cNvPr>
+          <p:cNvSpPr>
+            <a:spLocks noGrp="1"/>
+          </p:cNvSpPr>
+          <p:nvPr>
+            <p:ph type="ftr" sz="quarter" idx="11"/>
+          </p:nvPr>
+        </p:nvSpPr>
+        <p:spPr/>
+        <p:txBody>
+          <a:bodyPr/>
+          <a:lstStyle/>
+          <a:p>
+            <a:endParaRPr lang="fr-FR"/>
+          </a:p>
+        </p:txBody>
+      </p:sp>
+      <p:sp>
+        <p:nvSpPr>
+          <p:cNvPr id="7" name="Foliennummernplatzhalter 6">
+            <a:extLst>
+              <a:ext uri="{FF2B5EF4-FFF2-40B4-BE49-F238E27FC236}">
+                <a16:creationId xmlns:a16="http://schemas.microsoft.com/office/drawing/2014/main" id="{9FE4DB3E-9D86-4EF4-ACA0-C17227CF61F4}"/>
+              </a:ext>
+            </a:extLst>
+          </p:cNvPr>
+          <p:cNvSpPr>
+            <a:spLocks noGrp="1"/>
+          </p:cNvSpPr>
+          <p:nvPr>
+            <p:ph type="sldNum" sz="quarter" idx="12"/>
+          </p:nvPr>
+        </p:nvSpPr>
+        <p:spPr/>
+        <p:txBody>
+          <a:bodyPr/>
+          <a:lstStyle/>
+          <a:p>
+            <a:fld id="{EB019DF2-C5BA-49E0-AE61-5C48331C2434}" type="slidenum">
+              <a:rPr lang="fr-FR" smtClean="0"/>
+              <a:t>5</a:t>
+            </a:fld>
+            <a:endParaRPr lang="fr-FR"/>
+          </a:p>
+        </p:txBody>
+      </p:sp>
+      <p:pic>
+        <p:nvPicPr>
+          <p:cNvPr id="8" name="Inhaltsplatzhalter 7">
+            <a:extLst>
+              <a:ext uri="{FF2B5EF4-FFF2-40B4-BE49-F238E27FC236}">
+                <a16:creationId xmlns:a16="http://schemas.microsoft.com/office/drawing/2014/main" id="{566EE1C2-E81E-421C-B49F-F9B30F02235D}"/>
+              </a:ext>
+            </a:extLst>
+          </p:cNvPr>
+          <p:cNvPicPr>
+            <a:picLocks noGrp="1" noChangeAspect="1"/>
+          </p:cNvPicPr>
+          <p:nvPr>
+            <p:ph idx="1"/>
+          </p:nvPr>
+        </p:nvPicPr>
+        <p:blipFill>
+          <a:blip r:embed="rId2">
+            <a:extLst>
+              <a:ext uri="{28A0092B-C50C-407E-A947-70E740481C1C}">
+                <a14:useLocalDpi xmlns:a14="http://schemas.microsoft.com/office/drawing/2010/main" val="0"/>
+              </a:ext>
+            </a:extLst>
+          </a:blip>
+          <a:stretch>
+            <a:fillRect/>
+          </a:stretch>
+        </p:blipFill>
+        <p:spPr>
+          <a:xfrm>
+            <a:off x="1097280" y="2254885"/>
+            <a:ext cx="10058400" cy="2865756"/>
+          </a:xfrm>
+        </p:spPr>
+      </p:pic>
+    </p:spTree>
+    <p:extLst>
+      <p:ext uri="{BB962C8B-B14F-4D97-AF65-F5344CB8AC3E}">
+        <p14:creationId xmlns:p14="http://schemas.microsoft.com/office/powerpoint/2010/main" val="1456524931"/>
+      </p:ext>
+    </p:extLst>
+  </p:cSld>
+  <p:clrMapOvr>
+    <a:masterClrMapping/>
+  </p:clrMapOvr>
+</p:sld>
+</file>
+
+<file path=ppt/slides/slide6.xml><?xml version="1.0" encoding="utf-8"?>
 <p:sld xmlns:a="http://schemas.openxmlformats.org/drawingml/2006/main" xmlns:r="http://schemas.openxmlformats.org/officeDocument/2006/relationships" xmlns:p="http://schemas.openxmlformats.org/presentationml/2006/main">
   <p:cSld>
     <p:spTree>
@@ -5438,7 +6335,7 @@
           <a:p>
             <a:fld id="{EB019DF2-C5BA-49E0-AE61-5C48331C2434}" type="slidenum">
               <a:rPr lang="fr-FR" smtClean="0"/>
-              <a:t>4</a:t>
+              <a:t>6</a:t>
             </a:fld>
             <a:endParaRPr lang="fr-FR"/>
           </a:p>
@@ -5457,7 +6354,7 @@
 </p:sld>
 </file>
 
-<file path=ppt/slides/slide5.xml><?xml version="1.0" encoding="utf-8"?>
+<file path=ppt/slides/slide7.xml><?xml version="1.0" encoding="utf-8"?>
 <p:sld xmlns:a="http://schemas.openxmlformats.org/drawingml/2006/main" xmlns:r="http://schemas.openxmlformats.org/officeDocument/2006/relationships" xmlns:p="http://schemas.openxmlformats.org/presentationml/2006/main">
   <p:cSld>
     <p:spTree>
@@ -5560,7 +6457,7 @@
           <a:p>
             <a:fld id="{EB019DF2-C5BA-49E0-AE61-5C48331C2434}" type="slidenum">
               <a:rPr lang="fr-FR" smtClean="0"/>
-              <a:t>5</a:t>
+              <a:t>7</a:t>
             </a:fld>
             <a:endParaRPr lang="fr-FR"/>
           </a:p>
@@ -5765,350 +6662,6 @@
 </p:sld>
 </file>
 
-<file path=ppt/slides/slide6.xml><?xml version="1.0" encoding="utf-8"?>
-<p:sld xmlns:a="http://schemas.openxmlformats.org/drawingml/2006/main" xmlns:r="http://schemas.openxmlformats.org/officeDocument/2006/relationships" xmlns:p="http://schemas.openxmlformats.org/presentationml/2006/main">
-  <p:cSld>
-    <p:spTree>
-      <p:nvGrpSpPr>
-        <p:cNvPr id="1" name=""/>
-        <p:cNvGrpSpPr/>
-        <p:nvPr/>
-      </p:nvGrpSpPr>
-      <p:grpSpPr>
-        <a:xfrm>
-          <a:off x="0" y="0"/>
-          <a:ext cx="0" cy="0"/>
-          <a:chOff x="0" y="0"/>
-          <a:chExt cx="0" cy="0"/>
-        </a:xfrm>
-      </p:grpSpPr>
-      <p:sp>
-        <p:nvSpPr>
-          <p:cNvPr id="2" name="Titel 1">
-            <a:extLst>
-              <a:ext uri="{FF2B5EF4-FFF2-40B4-BE49-F238E27FC236}">
-                <a16:creationId xmlns:a16="http://schemas.microsoft.com/office/drawing/2014/main" id="{7434FCEC-02D2-4AB8-8029-D3E6EDFE2DAF}"/>
-              </a:ext>
-            </a:extLst>
-          </p:cNvPr>
-          <p:cNvSpPr>
-            <a:spLocks noGrp="1"/>
-          </p:cNvSpPr>
-          <p:nvPr>
-            <p:ph type="title"/>
-          </p:nvPr>
-        </p:nvSpPr>
-        <p:spPr/>
-        <p:txBody>
-          <a:bodyPr/>
-          <a:lstStyle/>
-          <a:p>
-            <a:r>
-              <a:rPr lang="fr-FR" dirty="0"/>
-              <a:t>Asynchrone - Handshake</a:t>
-            </a:r>
-          </a:p>
-        </p:txBody>
-      </p:sp>
-      <p:sp>
-        <p:nvSpPr>
-          <p:cNvPr id="6" name="Fußzeilenplatzhalter 5">
-            <a:extLst>
-              <a:ext uri="{FF2B5EF4-FFF2-40B4-BE49-F238E27FC236}">
-                <a16:creationId xmlns:a16="http://schemas.microsoft.com/office/drawing/2014/main" id="{C4D725A6-6D53-4091-A949-3B4755B8B8FA}"/>
-              </a:ext>
-            </a:extLst>
-          </p:cNvPr>
-          <p:cNvSpPr>
-            <a:spLocks noGrp="1"/>
-          </p:cNvSpPr>
-          <p:nvPr>
-            <p:ph type="ftr" sz="quarter" idx="11"/>
-          </p:nvPr>
-        </p:nvSpPr>
-        <p:spPr/>
-        <p:txBody>
-          <a:bodyPr/>
-          <a:lstStyle/>
-          <a:p>
-            <a:endParaRPr lang="fr-FR"/>
-          </a:p>
-        </p:txBody>
-      </p:sp>
-      <p:sp>
-        <p:nvSpPr>
-          <p:cNvPr id="7" name="Foliennummernplatzhalter 6">
-            <a:extLst>
-              <a:ext uri="{FF2B5EF4-FFF2-40B4-BE49-F238E27FC236}">
-                <a16:creationId xmlns:a16="http://schemas.microsoft.com/office/drawing/2014/main" id="{9FE4DB3E-9D86-4EF4-ACA0-C17227CF61F4}"/>
-              </a:ext>
-            </a:extLst>
-          </p:cNvPr>
-          <p:cNvSpPr>
-            <a:spLocks noGrp="1"/>
-          </p:cNvSpPr>
-          <p:nvPr>
-            <p:ph type="sldNum" sz="quarter" idx="12"/>
-          </p:nvPr>
-        </p:nvSpPr>
-        <p:spPr/>
-        <p:txBody>
-          <a:bodyPr/>
-          <a:lstStyle/>
-          <a:p>
-            <a:fld id="{EB019DF2-C5BA-49E0-AE61-5C48331C2434}" type="slidenum">
-              <a:rPr lang="fr-FR" smtClean="0"/>
-              <a:t>6</a:t>
-            </a:fld>
-            <a:endParaRPr lang="fr-FR"/>
-          </a:p>
-        </p:txBody>
-      </p:sp>
-      <p:pic>
-        <p:nvPicPr>
-          <p:cNvPr id="8" name="Inhaltsplatzhalter 7">
-            <a:extLst>
-              <a:ext uri="{FF2B5EF4-FFF2-40B4-BE49-F238E27FC236}">
-                <a16:creationId xmlns:a16="http://schemas.microsoft.com/office/drawing/2014/main" id="{566EE1C2-E81E-421C-B49F-F9B30F02235D}"/>
-              </a:ext>
-            </a:extLst>
-          </p:cNvPr>
-          <p:cNvPicPr>
-            <a:picLocks noGrp="1" noChangeAspect="1"/>
-          </p:cNvPicPr>
-          <p:nvPr>
-            <p:ph idx="1"/>
-          </p:nvPr>
-        </p:nvPicPr>
-        <p:blipFill>
-          <a:blip r:embed="rId2">
-            <a:extLst>
-              <a:ext uri="{28A0092B-C50C-407E-A947-70E740481C1C}">
-                <a14:useLocalDpi xmlns:a14="http://schemas.microsoft.com/office/drawing/2010/main" val="0"/>
-              </a:ext>
-            </a:extLst>
-          </a:blip>
-          <a:stretch>
-            <a:fillRect/>
-          </a:stretch>
-        </p:blipFill>
-        <p:spPr>
-          <a:xfrm>
-            <a:off x="1097280" y="2254885"/>
-            <a:ext cx="10058400" cy="2865756"/>
-          </a:xfrm>
-        </p:spPr>
-      </p:pic>
-    </p:spTree>
-    <p:extLst>
-      <p:ext uri="{BB962C8B-B14F-4D97-AF65-F5344CB8AC3E}">
-        <p14:creationId xmlns:p14="http://schemas.microsoft.com/office/powerpoint/2010/main" val="1456524931"/>
-      </p:ext>
-    </p:extLst>
-  </p:cSld>
-  <p:clrMapOvr>
-    <a:masterClrMapping/>
-  </p:clrMapOvr>
-</p:sld>
-</file>
-
-<file path=ppt/slides/slide7.xml><?xml version="1.0" encoding="utf-8"?>
-<p:sld xmlns:a="http://schemas.openxmlformats.org/drawingml/2006/main" xmlns:r="http://schemas.openxmlformats.org/officeDocument/2006/relationships" xmlns:p="http://schemas.openxmlformats.org/presentationml/2006/main">
-  <p:cSld>
-    <p:spTree>
-      <p:nvGrpSpPr>
-        <p:cNvPr id="1" name=""/>
-        <p:cNvGrpSpPr/>
-        <p:nvPr/>
-      </p:nvGrpSpPr>
-      <p:grpSpPr>
-        <a:xfrm>
-          <a:off x="0" y="0"/>
-          <a:ext cx="0" cy="0"/>
-          <a:chOff x="0" y="0"/>
-          <a:chExt cx="0" cy="0"/>
-        </a:xfrm>
-      </p:grpSpPr>
-      <p:sp>
-        <p:nvSpPr>
-          <p:cNvPr id="2" name="Titel 1">
-            <a:extLst>
-              <a:ext uri="{FF2B5EF4-FFF2-40B4-BE49-F238E27FC236}">
-                <a16:creationId xmlns:a16="http://schemas.microsoft.com/office/drawing/2014/main" id="{AFC84FF8-CCE7-414D-8191-C8540964458B}"/>
-              </a:ext>
-            </a:extLst>
-          </p:cNvPr>
-          <p:cNvSpPr>
-            <a:spLocks noGrp="1"/>
-          </p:cNvSpPr>
-          <p:nvPr>
-            <p:ph type="title"/>
-          </p:nvPr>
-        </p:nvSpPr>
-        <p:spPr/>
-        <p:txBody>
-          <a:bodyPr/>
-          <a:lstStyle/>
-          <a:p>
-            <a:r>
-              <a:rPr lang="fr-FR" dirty="0"/>
-              <a:t>Flot et Méthodologie</a:t>
-            </a:r>
-          </a:p>
-        </p:txBody>
-      </p:sp>
-      <p:sp>
-        <p:nvSpPr>
-          <p:cNvPr id="3" name="Inhaltsplatzhalter 2">
-            <a:extLst>
-              <a:ext uri="{FF2B5EF4-FFF2-40B4-BE49-F238E27FC236}">
-                <a16:creationId xmlns:a16="http://schemas.microsoft.com/office/drawing/2014/main" id="{FA11A7FA-E0CB-455C-8FE7-F9037EF2271C}"/>
-              </a:ext>
-            </a:extLst>
-          </p:cNvPr>
-          <p:cNvSpPr>
-            <a:spLocks noGrp="1"/>
-          </p:cNvSpPr>
-          <p:nvPr>
-            <p:ph idx="1"/>
-          </p:nvPr>
-        </p:nvSpPr>
-        <p:spPr/>
-        <p:txBody>
-          <a:bodyPr/>
-          <a:lstStyle/>
-          <a:p>
-            <a:r>
-              <a:rPr lang="fr-FR" dirty="0"/>
-              <a:t>Conception de Blocs combinatoires fonctionnels </a:t>
-            </a:r>
-          </a:p>
-          <a:p>
-            <a:pPr lvl="1"/>
-            <a:r>
-              <a:rPr lang="fr-FR" dirty="0"/>
-              <a:t>vérification en banc de test</a:t>
-            </a:r>
-          </a:p>
-          <a:p>
-            <a:r>
-              <a:rPr lang="fr-FR" dirty="0"/>
-              <a:t>Actualisation des données en entrée sur un signal enable (</a:t>
-            </a:r>
-            <a:r>
-              <a:rPr lang="fr-FR" dirty="0" err="1"/>
-              <a:t>cf</a:t>
-            </a:r>
-            <a:r>
-              <a:rPr lang="fr-FR" dirty="0"/>
-              <a:t> Architecture d’un Bloc)</a:t>
-            </a:r>
-          </a:p>
-          <a:p>
-            <a:r>
-              <a:rPr lang="fr-FR" dirty="0"/>
-              <a:t>Conception d’un contrôleur asynchrone universelle (réglage des délais simple)</a:t>
-            </a:r>
-          </a:p>
-          <a:p>
-            <a:pPr lvl="1"/>
-            <a:r>
-              <a:rPr lang="fr-FR" dirty="0"/>
-              <a:t>Forks et Joins adaptées </a:t>
-            </a:r>
-          </a:p>
-          <a:p>
-            <a:r>
-              <a:rPr lang="fr-FR" dirty="0"/>
-              <a:t>Mise en place du circuit de requête asynchrone et de l’initialisation</a:t>
-            </a:r>
-          </a:p>
-          <a:p>
-            <a:r>
-              <a:rPr lang="fr-FR" dirty="0"/>
-              <a:t>Connection des blocs au contrôleur asynchrone</a:t>
-            </a:r>
-          </a:p>
-          <a:p>
-            <a:r>
-              <a:rPr lang="fr-FR" dirty="0"/>
-              <a:t>Définition d’une mémoire d’instruction pour tester le </a:t>
-            </a:r>
-            <a:r>
-              <a:rPr lang="fr-FR" dirty="0" err="1"/>
-              <a:t>core</a:t>
-            </a:r>
-            <a:endParaRPr lang="fr-FR" dirty="0"/>
-          </a:p>
-        </p:txBody>
-      </p:sp>
-      <p:sp>
-        <p:nvSpPr>
-          <p:cNvPr id="4" name="Fußzeilenplatzhalter 3">
-            <a:extLst>
-              <a:ext uri="{FF2B5EF4-FFF2-40B4-BE49-F238E27FC236}">
-                <a16:creationId xmlns:a16="http://schemas.microsoft.com/office/drawing/2014/main" id="{05899B22-DABC-4E8F-AD82-6F02B8AA2259}"/>
-              </a:ext>
-            </a:extLst>
-          </p:cNvPr>
-          <p:cNvSpPr>
-            <a:spLocks noGrp="1"/>
-          </p:cNvSpPr>
-          <p:nvPr>
-            <p:ph type="ftr" sz="quarter" idx="11"/>
-          </p:nvPr>
-        </p:nvSpPr>
-        <p:spPr/>
-        <p:txBody>
-          <a:bodyPr/>
-          <a:lstStyle/>
-          <a:p>
-            <a:endParaRPr lang="fr-FR"/>
-          </a:p>
-        </p:txBody>
-      </p:sp>
-      <p:sp>
-        <p:nvSpPr>
-          <p:cNvPr id="5" name="Foliennummernplatzhalter 4">
-            <a:extLst>
-              <a:ext uri="{FF2B5EF4-FFF2-40B4-BE49-F238E27FC236}">
-                <a16:creationId xmlns:a16="http://schemas.microsoft.com/office/drawing/2014/main" id="{23AFAEFA-5866-41EF-947D-5D17DCA74FFB}"/>
-              </a:ext>
-            </a:extLst>
-          </p:cNvPr>
-          <p:cNvSpPr>
-            <a:spLocks noGrp="1"/>
-          </p:cNvSpPr>
-          <p:nvPr>
-            <p:ph type="sldNum" sz="quarter" idx="12"/>
-          </p:nvPr>
-        </p:nvSpPr>
-        <p:spPr/>
-        <p:txBody>
-          <a:bodyPr/>
-          <a:lstStyle/>
-          <a:p>
-            <a:fld id="{EB019DF2-C5BA-49E0-AE61-5C48331C2434}" type="slidenum">
-              <a:rPr lang="fr-FR" smtClean="0"/>
-              <a:t>7</a:t>
-            </a:fld>
-            <a:endParaRPr lang="fr-FR"/>
-          </a:p>
-        </p:txBody>
-      </p:sp>
-    </p:spTree>
-    <p:extLst>
-      <p:ext uri="{BB962C8B-B14F-4D97-AF65-F5344CB8AC3E}">
-        <p14:creationId xmlns:p14="http://schemas.microsoft.com/office/powerpoint/2010/main" val="4094620063"/>
-      </p:ext>
-    </p:extLst>
-  </p:cSld>
-  <p:clrMapOvr>
-    <a:masterClrMapping/>
-  </p:clrMapOvr>
-</p:sld>
-</file>
-
 <file path=ppt/slides/slide8.xml><?xml version="1.0" encoding="utf-8"?>
 <p:sld xmlns:a="http://schemas.openxmlformats.org/drawingml/2006/main" xmlns:r="http://schemas.openxmlformats.org/officeDocument/2006/relationships" xmlns:p="http://schemas.openxmlformats.org/presentationml/2006/main">
   <p:cSld>
@@ -6128,10 +6681,10 @@
       </p:grpSpPr>
       <p:sp>
         <p:nvSpPr>
-          <p:cNvPr id="4" name="Titel 3">
+          <p:cNvPr id="2" name="Titel 1">
             <a:extLst>
               <a:ext uri="{FF2B5EF4-FFF2-40B4-BE49-F238E27FC236}">
-                <a16:creationId xmlns:a16="http://schemas.microsoft.com/office/drawing/2014/main" id="{8899405F-553D-4A09-B41B-681586078A50}"/>
+                <a16:creationId xmlns:a16="http://schemas.microsoft.com/office/drawing/2014/main" id="{AFC84FF8-CCE7-414D-8191-C8540964458B}"/>
               </a:ext>
             </a:extLst>
           </p:cNvPr>
@@ -6149,17 +6702,17 @@
           <a:p>
             <a:r>
               <a:rPr lang="fr-FR" dirty="0"/>
-              <a:t>Résultats &amp; Perspectives</a:t>
-            </a:r>
-          </a:p>
-        </p:txBody>
-      </p:sp>
-      <p:sp>
-        <p:nvSpPr>
-          <p:cNvPr id="5" name="Inhaltsplatzhalter 4">
+              <a:t>Flot et Méthodologie</a:t>
+            </a:r>
+          </a:p>
+        </p:txBody>
+      </p:sp>
+      <p:sp>
+        <p:nvSpPr>
+          <p:cNvPr id="3" name="Inhaltsplatzhalter 2">
             <a:extLst>
               <a:ext uri="{FF2B5EF4-FFF2-40B4-BE49-F238E27FC236}">
-                <a16:creationId xmlns:a16="http://schemas.microsoft.com/office/drawing/2014/main" id="{D5EAF7C7-E869-43AB-92B6-8316D82AD729}"/>
+                <a16:creationId xmlns:a16="http://schemas.microsoft.com/office/drawing/2014/main" id="{FA11A7FA-E0CB-455C-8FE7-F9037EF2271C}"/>
               </a:ext>
             </a:extLst>
           </p:cNvPr>
@@ -6167,7 +6720,7 @@
             <a:spLocks noGrp="1"/>
           </p:cNvSpPr>
           <p:nvPr>
-            <p:ph sz="half" idx="1"/>
+            <p:ph idx="1"/>
           </p:nvPr>
         </p:nvSpPr>
         <p:spPr/>
@@ -6175,34 +6728,76 @@
           <a:bodyPr/>
           <a:lstStyle/>
           <a:p>
-            <a:pPr marL="0" indent="0">
-              <a:buNone/>
-            </a:pPr>
             <a:r>
               <a:rPr lang="fr-FR" dirty="0"/>
-              <a:t>POF:</a:t>
-            </a:r>
-          </a:p>
-          <a:p>
+              <a:t>Conception de Blocs combinatoires fonctionnels </a:t>
+            </a:r>
+          </a:p>
+          <a:p>
+            <a:pPr lvl="1"/>
             <a:r>
               <a:rPr lang="fr-FR" dirty="0"/>
-              <a:t>Architecture fonctionnelle et adaptable</a:t>
+              <a:t>vérification en banc de test</a:t>
             </a:r>
           </a:p>
           <a:p>
             <a:r>
               <a:rPr lang="fr-FR" dirty="0"/>
-              <a:t>Exécution de programme assembleur simple</a:t>
-            </a:r>
-          </a:p>
-        </p:txBody>
-      </p:sp>
-      <p:sp>
-        <p:nvSpPr>
-          <p:cNvPr id="6" name="Inhaltsplatzhalter 5">
+              <a:t>Actualisation des données en entrée sur un signal enable (</a:t>
+            </a:r>
+            <a:r>
+              <a:rPr lang="fr-FR" dirty="0" err="1"/>
+              <a:t>cf</a:t>
+            </a:r>
+            <a:r>
+              <a:rPr lang="fr-FR" dirty="0"/>
+              <a:t> Architecture d’un Bloc)</a:t>
+            </a:r>
+          </a:p>
+          <a:p>
+            <a:r>
+              <a:rPr lang="fr-FR" dirty="0"/>
+              <a:t>Conception d’un contrôleur asynchrone universelle (réglage des délais simple)</a:t>
+            </a:r>
+          </a:p>
+          <a:p>
+            <a:pPr lvl="1"/>
+            <a:r>
+              <a:rPr lang="fr-FR" dirty="0"/>
+              <a:t>Forks et Joins adaptées </a:t>
+            </a:r>
+          </a:p>
+          <a:p>
+            <a:r>
+              <a:rPr lang="fr-FR" dirty="0"/>
+              <a:t>Mise en place du circuit de requête asynchrone et de l’initialisation</a:t>
+            </a:r>
+          </a:p>
+          <a:p>
+            <a:r>
+              <a:rPr lang="fr-FR" dirty="0"/>
+              <a:t>Connection des blocs au contrôleur asynchrone</a:t>
+            </a:r>
+          </a:p>
+          <a:p>
+            <a:r>
+              <a:rPr lang="fr-FR" dirty="0"/>
+              <a:t>Définition d’une mémoire d’instruction pour tester le </a:t>
+            </a:r>
+            <a:r>
+              <a:rPr lang="fr-FR" dirty="0" err="1"/>
+              <a:t>core</a:t>
+            </a:r>
+            <a:endParaRPr lang="fr-FR" dirty="0"/>
+          </a:p>
+        </p:txBody>
+      </p:sp>
+      <p:sp>
+        <p:nvSpPr>
+          <p:cNvPr id="4" name="Fußzeilenplatzhalter 3">
             <a:extLst>
               <a:ext uri="{FF2B5EF4-FFF2-40B4-BE49-F238E27FC236}">
-                <a16:creationId xmlns:a16="http://schemas.microsoft.com/office/drawing/2014/main" id="{6D0A172A-CE17-4F3B-8218-0C5A9C7BE949}"/>
+                <a16:creationId xmlns:a16="http://schemas.microsoft.com/office/drawing/2014/main" id="{05899B22-DABC-4E8F-AD82-6F02B8AA2259}"/>
               </a:ext>
             </a:extLst>
           </p:cNvPr>
@@ -6210,7 +6805,7 @@
             <a:spLocks noGrp="1"/>
           </p:cNvSpPr>
           <p:nvPr>
-            <p:ph sz="half" idx="2"/>
+            <p:ph type="ftr" sz="quarter" idx="11"/>
           </p:nvPr>
         </p:nvSpPr>
         <p:spPr/>
@@ -6218,92 +6813,16 @@
           <a:bodyPr/>
           <a:lstStyle/>
           <a:p>
-            <a:r>
-              <a:rPr lang="fr-FR" dirty="0"/>
-              <a:t>Gestion des exceptions</a:t>
-            </a:r>
-          </a:p>
-          <a:p>
-            <a:r>
-              <a:rPr lang="fr-FR" dirty="0"/>
-              <a:t>Différents modes d’exécution (</a:t>
-            </a:r>
-            <a:r>
-              <a:rPr lang="fr-FR" dirty="0" err="1"/>
-              <a:t>Debug</a:t>
-            </a:r>
-            <a:r>
-              <a:rPr lang="fr-FR" dirty="0"/>
-              <a:t>)</a:t>
-            </a:r>
-          </a:p>
-          <a:p>
-            <a:r>
-              <a:rPr lang="fr-FR" dirty="0"/>
-              <a:t>Gestion des CSR</a:t>
-            </a:r>
-          </a:p>
-          <a:p>
-            <a:r>
-              <a:rPr lang="fr-FR" dirty="0"/>
-              <a:t>Ajout de fonctionnalités supplémentaires (p. ex. </a:t>
-            </a:r>
-            <a:r>
-              <a:rPr lang="fr-FR" dirty="0" err="1"/>
-              <a:t>Mult</a:t>
-            </a:r>
-            <a:r>
-              <a:rPr lang="fr-FR" dirty="0"/>
-              <a:t>/Div)</a:t>
-            </a:r>
-          </a:p>
-          <a:p>
-            <a:r>
-              <a:rPr lang="fr-FR" dirty="0"/>
-              <a:t>Revoir Fork et </a:t>
-            </a:r>
-            <a:r>
-              <a:rPr lang="fr-FR" dirty="0" err="1"/>
-              <a:t>Join</a:t>
-            </a:r>
-            <a:r>
-              <a:rPr lang="fr-FR" dirty="0"/>
-              <a:t> en Split et Merge</a:t>
-            </a:r>
-          </a:p>
-        </p:txBody>
-      </p:sp>
-      <p:sp>
-        <p:nvSpPr>
-          <p:cNvPr id="7" name="Fußzeilenplatzhalter 6">
+            <a:endParaRPr lang="fr-FR"/>
+          </a:p>
+        </p:txBody>
+      </p:sp>
+      <p:sp>
+        <p:nvSpPr>
+          <p:cNvPr id="5" name="Foliennummernplatzhalter 4">
             <a:extLst>
               <a:ext uri="{FF2B5EF4-FFF2-40B4-BE49-F238E27FC236}">
-                <a16:creationId xmlns:a16="http://schemas.microsoft.com/office/drawing/2014/main" id="{BBA56BB5-57E5-420F-A9D2-C325ECBEA65F}"/>
-              </a:ext>
-            </a:extLst>
-          </p:cNvPr>
-          <p:cNvSpPr>
-            <a:spLocks noGrp="1"/>
-          </p:cNvSpPr>
-          <p:nvPr>
-            <p:ph type="ftr" sz="quarter" idx="11"/>
-          </p:nvPr>
-        </p:nvSpPr>
-        <p:spPr/>
-        <p:txBody>
-          <a:bodyPr/>
-          <a:lstStyle/>
-          <a:p>
-            <a:endParaRPr lang="fr-FR"/>
-          </a:p>
-        </p:txBody>
-      </p:sp>
-      <p:sp>
-        <p:nvSpPr>
-          <p:cNvPr id="8" name="Foliennummernplatzhalter 7">
-            <a:extLst>
-              <a:ext uri="{FF2B5EF4-FFF2-40B4-BE49-F238E27FC236}">
-                <a16:creationId xmlns:a16="http://schemas.microsoft.com/office/drawing/2014/main" id="{F65BA561-27B5-49F8-A2B6-33549B4AB6D7}"/>
+                <a16:creationId xmlns:a16="http://schemas.microsoft.com/office/drawing/2014/main" id="{23AFAEFA-5866-41EF-947D-5D17DCA74FFB}"/>
               </a:ext>
             </a:extLst>
           </p:cNvPr>
@@ -6330,7 +6849,7 @@
     </p:spTree>
     <p:extLst>
       <p:ext uri="{BB962C8B-B14F-4D97-AF65-F5344CB8AC3E}">
-        <p14:creationId xmlns:p14="http://schemas.microsoft.com/office/powerpoint/2010/main" val="1500715639"/>
+        <p14:creationId xmlns:p14="http://schemas.microsoft.com/office/powerpoint/2010/main" val="4094620063"/>
       </p:ext>
     </p:extLst>
   </p:cSld>
@@ -6379,9 +6898,10 @@
           <a:lstStyle/>
           <a:p>
             <a:r>
-              <a:rPr lang="fr-FR" dirty="0"/>
-              <a:t>Conclusion</a:t>
-            </a:r>
+              <a:rPr lang="fr-FR" dirty="0" err="1"/>
+              <a:t>Resultats</a:t>
+            </a:r>
+            <a:endParaRPr lang="fr-FR" dirty="0"/>
           </a:p>
         </p:txBody>
       </p:sp>

</xml_diff>